<commit_message>
Game night link, Accessibility page fix
Add signup link for the Game Night; fix redundant link to Slides repo on the Accessibility webpage; updated the pptx slide template
</commit_message>
<xml_diff>
--- a/assets/C4L2021-template.pptx
+++ b/assets/C4L2021-template.pptx
@@ -6,6 +6,9 @@
   </p:sldMasterIdLst>
   <p:sldIdLst>
     <p:sldId id="256" r:id="rId2"/>
+    <p:sldId id="257" r:id="rId3"/>
+    <p:sldId id="258" r:id="rId4"/>
+    <p:sldId id="259" r:id="rId5"/>
   </p:sldIdLst>
   <p:sldSz cx="12192000" cy="6858000"/>
   <p:notesSz cx="6858000" cy="9144000"/>
@@ -104,6 +107,11 @@
       </a:defRPr>
     </a:lvl9pPr>
   </p:defaultTextStyle>
+  <p:extLst>
+    <p:ext uri="{EFAFB233-063F-42B5-8137-9DF3F51BA10A}">
+      <p15:sldGuideLst xmlns:p15="http://schemas.microsoft.com/office/powerpoint/2012/main"/>
+    </p:ext>
+  </p:extLst>
 </p:presentation>
 </file>
 
@@ -379,7 +387,7 @@
           <a:p>
             <a:fld id="{DC542904-3975-4E3E-BBB9-A828B1A3FA3D}" type="datetimeFigureOut">
               <a:rPr lang="en-US" smtClean="0"/>
-              <a:t>1/25/2021</a:t>
+              <a:t>3/2/2021</a:t>
             </a:fld>
             <a:endParaRPr lang="en-US"/>
           </a:p>
@@ -587,7 +595,7 @@
           <a:p>
             <a:fld id="{DC542904-3975-4E3E-BBB9-A828B1A3FA3D}" type="datetimeFigureOut">
               <a:rPr lang="en-US" smtClean="0"/>
-              <a:t>1/25/2021</a:t>
+              <a:t>3/2/2021</a:t>
             </a:fld>
             <a:endParaRPr lang="en-US"/>
           </a:p>
@@ -795,7 +803,7 @@
           <a:p>
             <a:fld id="{DC542904-3975-4E3E-BBB9-A828B1A3FA3D}" type="datetimeFigureOut">
               <a:rPr lang="en-US" smtClean="0"/>
-              <a:t>1/25/2021</a:t>
+              <a:t>3/2/2021</a:t>
             </a:fld>
             <a:endParaRPr lang="en-US"/>
           </a:p>
@@ -1070,7 +1078,7 @@
           <a:p>
             <a:fld id="{DC542904-3975-4E3E-BBB9-A828B1A3FA3D}" type="datetimeFigureOut">
               <a:rPr lang="en-US" smtClean="0"/>
-              <a:t>1/25/2021</a:t>
+              <a:t>3/2/2021</a:t>
             </a:fld>
             <a:endParaRPr lang="en-US"/>
           </a:p>
@@ -1340,7 +1348,7 @@
           <a:p>
             <a:fld id="{DC542904-3975-4E3E-BBB9-A828B1A3FA3D}" type="datetimeFigureOut">
               <a:rPr lang="en-US" smtClean="0"/>
-              <a:t>1/25/2021</a:t>
+              <a:t>3/2/2021</a:t>
             </a:fld>
             <a:endParaRPr lang="en-US"/>
           </a:p>
@@ -1752,7 +1760,7 @@
           <a:p>
             <a:fld id="{DC542904-3975-4E3E-BBB9-A828B1A3FA3D}" type="datetimeFigureOut">
               <a:rPr lang="en-US" smtClean="0"/>
-              <a:t>1/25/2021</a:t>
+              <a:t>3/2/2021</a:t>
             </a:fld>
             <a:endParaRPr lang="en-US"/>
           </a:p>
@@ -1898,7 +1906,7 @@
           <a:p>
             <a:fld id="{DC542904-3975-4E3E-BBB9-A828B1A3FA3D}" type="datetimeFigureOut">
               <a:rPr lang="en-US" smtClean="0"/>
-              <a:t>1/25/2021</a:t>
+              <a:t>3/2/2021</a:t>
             </a:fld>
             <a:endParaRPr lang="en-US"/>
           </a:p>
@@ -2011,7 +2019,7 @@
           <a:p>
             <a:fld id="{DC542904-3975-4E3E-BBB9-A828B1A3FA3D}" type="datetimeFigureOut">
               <a:rPr lang="en-US" smtClean="0"/>
-              <a:t>1/25/2021</a:t>
+              <a:t>3/2/2021</a:t>
             </a:fld>
             <a:endParaRPr lang="en-US"/>
           </a:p>
@@ -2324,7 +2332,7 @@
           <a:p>
             <a:fld id="{DC542904-3975-4E3E-BBB9-A828B1A3FA3D}" type="datetimeFigureOut">
               <a:rPr lang="en-US" smtClean="0"/>
-              <a:t>1/25/2021</a:t>
+              <a:t>3/2/2021</a:t>
             </a:fld>
             <a:endParaRPr lang="en-US"/>
           </a:p>
@@ -2614,7 +2622,7 @@
           <a:p>
             <a:fld id="{DC542904-3975-4E3E-BBB9-A828B1A3FA3D}" type="datetimeFigureOut">
               <a:rPr lang="en-US" smtClean="0"/>
-              <a:t>1/25/2021</a:t>
+              <a:t>3/2/2021</a:t>
             </a:fld>
             <a:endParaRPr lang="en-US"/>
           </a:p>
@@ -2864,7 +2872,7 @@
           <a:p>
             <a:fld id="{DC542904-3975-4E3E-BBB9-A828B1A3FA3D}" type="datetimeFigureOut">
               <a:rPr lang="en-US" smtClean="0"/>
-              <a:t>1/25/2021</a:t>
+              <a:t>3/2/2021</a:t>
             </a:fld>
             <a:endParaRPr lang="en-US"/>
           </a:p>
@@ -3344,6 +3352,246 @@
 </p:sld>
 </file>
 
+<file path=ppt/slides/slide2.xml><?xml version="1.0" encoding="utf-8"?>
+<p:sld xmlns:a="http://schemas.openxmlformats.org/drawingml/2006/main" xmlns:r="http://schemas.openxmlformats.org/officeDocument/2006/relationships" xmlns:p="http://schemas.openxmlformats.org/presentationml/2006/main">
+  <p:cSld>
+    <p:spTree>
+      <p:nvGrpSpPr>
+        <p:cNvPr id="1" name=""/>
+        <p:cNvGrpSpPr/>
+        <p:nvPr/>
+      </p:nvGrpSpPr>
+      <p:grpSpPr>
+        <a:xfrm>
+          <a:off x="0" y="0"/>
+          <a:ext cx="0" cy="0"/>
+          <a:chOff x="0" y="0"/>
+          <a:chExt cx="0" cy="0"/>
+        </a:xfrm>
+      </p:grpSpPr>
+      <p:sp>
+        <p:nvSpPr>
+          <p:cNvPr id="2" name="Title 1">
+            <a:extLst>
+              <a:ext uri="{FF2B5EF4-FFF2-40B4-BE49-F238E27FC236}">
+                <a16:creationId xmlns:a16="http://schemas.microsoft.com/office/drawing/2014/main" id="{85A72A69-3745-4618-9B93-9EFD3D2CC565}"/>
+              </a:ext>
+            </a:extLst>
+          </p:cNvPr>
+          <p:cNvSpPr>
+            <a:spLocks noGrp="1"/>
+          </p:cNvSpPr>
+          <p:nvPr>
+            <p:ph type="title"/>
+          </p:nvPr>
+        </p:nvSpPr>
+        <p:spPr/>
+        <p:txBody>
+          <a:bodyPr/>
+          <a:lstStyle/>
+          <a:p>
+            <a:endParaRPr lang="en-US"/>
+          </a:p>
+        </p:txBody>
+      </p:sp>
+      <p:sp>
+        <p:nvSpPr>
+          <p:cNvPr id="3" name="Content Placeholder 2">
+            <a:extLst>
+              <a:ext uri="{FF2B5EF4-FFF2-40B4-BE49-F238E27FC236}">
+                <a16:creationId xmlns:a16="http://schemas.microsoft.com/office/drawing/2014/main" id="{9D31B980-5E1B-48FD-BA2B-97A728DF352F}"/>
+              </a:ext>
+            </a:extLst>
+          </p:cNvPr>
+          <p:cNvSpPr>
+            <a:spLocks noGrp="1"/>
+          </p:cNvSpPr>
+          <p:nvPr>
+            <p:ph idx="1"/>
+          </p:nvPr>
+        </p:nvSpPr>
+        <p:spPr/>
+        <p:txBody>
+          <a:bodyPr/>
+          <a:lstStyle/>
+          <a:p>
+            <a:endParaRPr lang="en-US"/>
+          </a:p>
+        </p:txBody>
+      </p:sp>
+    </p:spTree>
+    <p:extLst>
+      <p:ext uri="{BB962C8B-B14F-4D97-AF65-F5344CB8AC3E}">
+        <p14:creationId xmlns:p14="http://schemas.microsoft.com/office/powerpoint/2010/main" val="3458549307"/>
+      </p:ext>
+    </p:extLst>
+  </p:cSld>
+  <p:clrMapOvr>
+    <a:masterClrMapping/>
+  </p:clrMapOvr>
+</p:sld>
+</file>
+
+<file path=ppt/slides/slide3.xml><?xml version="1.0" encoding="utf-8"?>
+<p:sld xmlns:a="http://schemas.openxmlformats.org/drawingml/2006/main" xmlns:r="http://schemas.openxmlformats.org/officeDocument/2006/relationships" xmlns:p="http://schemas.openxmlformats.org/presentationml/2006/main">
+  <p:cSld>
+    <p:spTree>
+      <p:nvGrpSpPr>
+        <p:cNvPr id="1" name=""/>
+        <p:cNvGrpSpPr/>
+        <p:nvPr/>
+      </p:nvGrpSpPr>
+      <p:grpSpPr>
+        <a:xfrm>
+          <a:off x="0" y="0"/>
+          <a:ext cx="0" cy="0"/>
+          <a:chOff x="0" y="0"/>
+          <a:chExt cx="0" cy="0"/>
+        </a:xfrm>
+      </p:grpSpPr>
+      <p:sp>
+        <p:nvSpPr>
+          <p:cNvPr id="2" name="Title 1">
+            <a:extLst>
+              <a:ext uri="{FF2B5EF4-FFF2-40B4-BE49-F238E27FC236}">
+                <a16:creationId xmlns:a16="http://schemas.microsoft.com/office/drawing/2014/main" id="{0F74F21C-636E-435C-9595-B7B599930558}"/>
+              </a:ext>
+            </a:extLst>
+          </p:cNvPr>
+          <p:cNvSpPr>
+            <a:spLocks noGrp="1"/>
+          </p:cNvSpPr>
+          <p:nvPr>
+            <p:ph type="title"/>
+          </p:nvPr>
+        </p:nvSpPr>
+        <p:spPr/>
+        <p:txBody>
+          <a:bodyPr/>
+          <a:lstStyle/>
+          <a:p>
+            <a:endParaRPr lang="en-US"/>
+          </a:p>
+        </p:txBody>
+      </p:sp>
+      <p:sp>
+        <p:nvSpPr>
+          <p:cNvPr id="3" name="Content Placeholder 2">
+            <a:extLst>
+              <a:ext uri="{FF2B5EF4-FFF2-40B4-BE49-F238E27FC236}">
+                <a16:creationId xmlns:a16="http://schemas.microsoft.com/office/drawing/2014/main" id="{B4356FBE-39F9-4CFA-AFF5-BD9CDA9819ED}"/>
+              </a:ext>
+            </a:extLst>
+          </p:cNvPr>
+          <p:cNvSpPr>
+            <a:spLocks noGrp="1"/>
+          </p:cNvSpPr>
+          <p:nvPr>
+            <p:ph idx="1"/>
+          </p:nvPr>
+        </p:nvSpPr>
+        <p:spPr/>
+        <p:txBody>
+          <a:bodyPr/>
+          <a:lstStyle/>
+          <a:p>
+            <a:endParaRPr lang="en-US"/>
+          </a:p>
+        </p:txBody>
+      </p:sp>
+    </p:spTree>
+    <p:extLst>
+      <p:ext uri="{BB962C8B-B14F-4D97-AF65-F5344CB8AC3E}">
+        <p14:creationId xmlns:p14="http://schemas.microsoft.com/office/powerpoint/2010/main" val="2546703679"/>
+      </p:ext>
+    </p:extLst>
+  </p:cSld>
+  <p:clrMapOvr>
+    <a:masterClrMapping/>
+  </p:clrMapOvr>
+</p:sld>
+</file>
+
+<file path=ppt/slides/slide4.xml><?xml version="1.0" encoding="utf-8"?>
+<p:sld xmlns:a="http://schemas.openxmlformats.org/drawingml/2006/main" xmlns:r="http://schemas.openxmlformats.org/officeDocument/2006/relationships" xmlns:p="http://schemas.openxmlformats.org/presentationml/2006/main">
+  <p:cSld>
+    <p:spTree>
+      <p:nvGrpSpPr>
+        <p:cNvPr id="1" name=""/>
+        <p:cNvGrpSpPr/>
+        <p:nvPr/>
+      </p:nvGrpSpPr>
+      <p:grpSpPr>
+        <a:xfrm>
+          <a:off x="0" y="0"/>
+          <a:ext cx="0" cy="0"/>
+          <a:chOff x="0" y="0"/>
+          <a:chExt cx="0" cy="0"/>
+        </a:xfrm>
+      </p:grpSpPr>
+      <p:sp>
+        <p:nvSpPr>
+          <p:cNvPr id="2" name="Title 1">
+            <a:extLst>
+              <a:ext uri="{FF2B5EF4-FFF2-40B4-BE49-F238E27FC236}">
+                <a16:creationId xmlns:a16="http://schemas.microsoft.com/office/drawing/2014/main" id="{B472305B-EC87-40D6-936B-78341964C46E}"/>
+              </a:ext>
+            </a:extLst>
+          </p:cNvPr>
+          <p:cNvSpPr>
+            <a:spLocks noGrp="1"/>
+          </p:cNvSpPr>
+          <p:nvPr>
+            <p:ph type="title"/>
+          </p:nvPr>
+        </p:nvSpPr>
+        <p:spPr/>
+        <p:txBody>
+          <a:bodyPr/>
+          <a:lstStyle/>
+          <a:p>
+            <a:endParaRPr lang="en-US"/>
+          </a:p>
+        </p:txBody>
+      </p:sp>
+      <p:sp>
+        <p:nvSpPr>
+          <p:cNvPr id="3" name="Content Placeholder 2">
+            <a:extLst>
+              <a:ext uri="{FF2B5EF4-FFF2-40B4-BE49-F238E27FC236}">
+                <a16:creationId xmlns:a16="http://schemas.microsoft.com/office/drawing/2014/main" id="{2CF0B50F-59AC-4F26-947F-5B1FF21B552B}"/>
+              </a:ext>
+            </a:extLst>
+          </p:cNvPr>
+          <p:cNvSpPr>
+            <a:spLocks noGrp="1"/>
+          </p:cNvSpPr>
+          <p:nvPr>
+            <p:ph idx="1"/>
+          </p:nvPr>
+        </p:nvSpPr>
+        <p:spPr/>
+        <p:txBody>
+          <a:bodyPr/>
+          <a:lstStyle/>
+          <a:p>
+            <a:endParaRPr lang="en-US"/>
+          </a:p>
+        </p:txBody>
+      </p:sp>
+    </p:spTree>
+    <p:extLst>
+      <p:ext uri="{BB962C8B-B14F-4D97-AF65-F5344CB8AC3E}">
+        <p14:creationId xmlns:p14="http://schemas.microsoft.com/office/powerpoint/2010/main" val="1569388381"/>
+      </p:ext>
+    </p:extLst>
+  </p:cSld>
+  <p:clrMapOvr>
+    <a:masterClrMapping/>
+  </p:clrMapOvr>
+</p:sld>
+</file>
+
 <file path=ppt/theme/theme1.xml><?xml version="1.0" encoding="utf-8"?>
 <a:theme xmlns:a="http://schemas.openxmlformats.org/drawingml/2006/main" name="Office Theme">
   <a:themeElements>

</xml_diff>